<commit_message>
merged tlp from experimental-temp
</commit_message>
<xml_diff>
--- a/presentation/presentation_tlp.pptx
+++ b/presentation/presentation_tlp.pptx
@@ -225,7 +225,7 @@
             <a:fld id="{3D422E2D-F444-4247-A734-F4F6FD7BA438}" type="datetimeFigureOut">
               <a:rPr lang="de-DE" smtClean="0"/>
               <a:pPr/>
-              <a:t>21.01.16</a:t>
+              <a:t>26.01.16</a:t>
             </a:fld>
             <a:endParaRPr lang="de-DE"/>
           </a:p>
@@ -3044,216 +3044,6 @@
       </p:sp>
       <p:cxnSp>
         <p:nvCxnSpPr>
-          <p:cNvPr id="7" name="Gerade Verbindung 6"/>
-          <p:cNvCxnSpPr/>
-          <p:nvPr/>
-        </p:nvCxnSpPr>
-        <p:spPr>
-          <a:xfrm>
-            <a:off x="1331640" y="2276872"/>
-            <a:ext cx="720080" cy="0"/>
-          </a:xfrm>
-          <a:prstGeom prst="line">
-            <a:avLst/>
-          </a:prstGeom>
-        </p:spPr>
-        <p:style>
-          <a:lnRef idx="2">
-            <a:schemeClr val="accent1"/>
-          </a:lnRef>
-          <a:fillRef idx="0">
-            <a:schemeClr val="accent1"/>
-          </a:fillRef>
-          <a:effectRef idx="1">
-            <a:schemeClr val="accent1"/>
-          </a:effectRef>
-          <a:fontRef idx="minor">
-            <a:schemeClr val="tx1"/>
-          </a:fontRef>
-        </p:style>
-      </p:cxnSp>
-      <p:cxnSp>
-        <p:nvCxnSpPr>
-          <p:cNvPr id="9" name="Gerade Verbindung 8"/>
-          <p:cNvCxnSpPr/>
-          <p:nvPr/>
-        </p:nvCxnSpPr>
-        <p:spPr>
-          <a:xfrm>
-            <a:off x="2051720" y="2060848"/>
-            <a:ext cx="0" cy="432048"/>
-          </a:xfrm>
-          <a:prstGeom prst="line">
-            <a:avLst/>
-          </a:prstGeom>
-        </p:spPr>
-        <p:style>
-          <a:lnRef idx="2">
-            <a:schemeClr val="accent1"/>
-          </a:lnRef>
-          <a:fillRef idx="0">
-            <a:schemeClr val="accent1"/>
-          </a:fillRef>
-          <a:effectRef idx="1">
-            <a:schemeClr val="accent1"/>
-          </a:effectRef>
-          <a:fontRef idx="minor">
-            <a:schemeClr val="tx1"/>
-          </a:fontRef>
-        </p:style>
-      </p:cxnSp>
-      <p:cxnSp>
-        <p:nvCxnSpPr>
-          <p:cNvPr id="11" name="Gerade Verbindung 10"/>
-          <p:cNvCxnSpPr/>
-          <p:nvPr/>
-        </p:nvCxnSpPr>
-        <p:spPr>
-          <a:xfrm>
-            <a:off x="1331640" y="2060848"/>
-            <a:ext cx="0" cy="432048"/>
-          </a:xfrm>
-          <a:prstGeom prst="line">
-            <a:avLst/>
-          </a:prstGeom>
-        </p:spPr>
-        <p:style>
-          <a:lnRef idx="2">
-            <a:schemeClr val="accent1"/>
-          </a:lnRef>
-          <a:fillRef idx="0">
-            <a:schemeClr val="accent1"/>
-          </a:fillRef>
-          <a:effectRef idx="1">
-            <a:schemeClr val="accent1"/>
-          </a:effectRef>
-          <a:fontRef idx="minor">
-            <a:schemeClr val="tx1"/>
-          </a:fontRef>
-        </p:style>
-      </p:cxnSp>
-      <p:cxnSp>
-        <p:nvCxnSpPr>
-          <p:cNvPr id="14" name="Gerade Verbindung 13"/>
-          <p:cNvCxnSpPr/>
-          <p:nvPr/>
-        </p:nvCxnSpPr>
-        <p:spPr>
-          <a:xfrm>
-            <a:off x="1187624" y="2060848"/>
-            <a:ext cx="288032" cy="0"/>
-          </a:xfrm>
-          <a:prstGeom prst="line">
-            <a:avLst/>
-          </a:prstGeom>
-        </p:spPr>
-        <p:style>
-          <a:lnRef idx="2">
-            <a:schemeClr val="accent1"/>
-          </a:lnRef>
-          <a:fillRef idx="0">
-            <a:schemeClr val="accent1"/>
-          </a:fillRef>
-          <a:effectRef idx="1">
-            <a:schemeClr val="accent1"/>
-          </a:effectRef>
-          <a:fontRef idx="minor">
-            <a:schemeClr val="tx1"/>
-          </a:fontRef>
-        </p:style>
-      </p:cxnSp>
-      <p:cxnSp>
-        <p:nvCxnSpPr>
-          <p:cNvPr id="19" name="Gerade Verbindung 18"/>
-          <p:cNvCxnSpPr/>
-          <p:nvPr/>
-        </p:nvCxnSpPr>
-        <p:spPr>
-          <a:xfrm>
-            <a:off x="1907704" y="2060848"/>
-            <a:ext cx="288032" cy="0"/>
-          </a:xfrm>
-          <a:prstGeom prst="line">
-            <a:avLst/>
-          </a:prstGeom>
-        </p:spPr>
-        <p:style>
-          <a:lnRef idx="2">
-            <a:schemeClr val="accent1"/>
-          </a:lnRef>
-          <a:fillRef idx="0">
-            <a:schemeClr val="accent1"/>
-          </a:fillRef>
-          <a:effectRef idx="1">
-            <a:schemeClr val="accent1"/>
-          </a:effectRef>
-          <a:fontRef idx="minor">
-            <a:schemeClr val="tx1"/>
-          </a:fontRef>
-        </p:style>
-      </p:cxnSp>
-      <p:cxnSp>
-        <p:nvCxnSpPr>
-          <p:cNvPr id="20" name="Gerade Verbindung 19"/>
-          <p:cNvCxnSpPr/>
-          <p:nvPr/>
-        </p:nvCxnSpPr>
-        <p:spPr>
-          <a:xfrm>
-            <a:off x="1907704" y="2492896"/>
-            <a:ext cx="288032" cy="0"/>
-          </a:xfrm>
-          <a:prstGeom prst="line">
-            <a:avLst/>
-          </a:prstGeom>
-        </p:spPr>
-        <p:style>
-          <a:lnRef idx="2">
-            <a:schemeClr val="accent1"/>
-          </a:lnRef>
-          <a:fillRef idx="0">
-            <a:schemeClr val="accent1"/>
-          </a:fillRef>
-          <a:effectRef idx="1">
-            <a:schemeClr val="accent1"/>
-          </a:effectRef>
-          <a:fontRef idx="minor">
-            <a:schemeClr val="tx1"/>
-          </a:fontRef>
-        </p:style>
-      </p:cxnSp>
-      <p:cxnSp>
-        <p:nvCxnSpPr>
-          <p:cNvPr id="21" name="Gerade Verbindung 20"/>
-          <p:cNvCxnSpPr/>
-          <p:nvPr/>
-        </p:nvCxnSpPr>
-        <p:spPr>
-          <a:xfrm>
-            <a:off x="1187624" y="2492896"/>
-            <a:ext cx="288032" cy="0"/>
-          </a:xfrm>
-          <a:prstGeom prst="line">
-            <a:avLst/>
-          </a:prstGeom>
-        </p:spPr>
-        <p:style>
-          <a:lnRef idx="2">
-            <a:schemeClr val="accent1"/>
-          </a:lnRef>
-          <a:fillRef idx="0">
-            <a:schemeClr val="accent1"/>
-          </a:fillRef>
-          <a:effectRef idx="1">
-            <a:schemeClr val="accent1"/>
-          </a:effectRef>
-          <a:fontRef idx="minor">
-            <a:schemeClr val="tx1"/>
-          </a:fontRef>
-        </p:style>
-      </p:cxnSp>
-      <p:cxnSp>
-        <p:nvCxnSpPr>
           <p:cNvPr id="23" name="Gerade Verbindung 22"/>
           <p:cNvCxnSpPr/>
           <p:nvPr/>
@@ -3507,352 +3297,6 @@
       </p:sp>
       <p:sp>
         <p:nvSpPr>
-          <p:cNvPr id="37" name="Geschweifte Klammer rechts 36"/>
-          <p:cNvSpPr/>
-          <p:nvPr/>
-        </p:nvSpPr>
-        <p:spPr>
-          <a:xfrm rot="5400000">
-            <a:off x="1547664" y="2564904"/>
-            <a:ext cx="288032" cy="720080"/>
-          </a:xfrm>
-          <a:prstGeom prst="rightBrace">
-            <a:avLst/>
-          </a:prstGeom>
-        </p:spPr>
-        <p:style>
-          <a:lnRef idx="2">
-            <a:schemeClr val="accent1"/>
-          </a:lnRef>
-          <a:fillRef idx="0">
-            <a:schemeClr val="accent1"/>
-          </a:fillRef>
-          <a:effectRef idx="1">
-            <a:schemeClr val="accent1"/>
-          </a:effectRef>
-          <a:fontRef idx="minor">
-            <a:schemeClr val="tx1"/>
-          </a:fontRef>
-        </p:style>
-        <p:txBody>
-          <a:bodyPr rtlCol="0" anchor="ctr"/>
-          <a:lstStyle/>
-          <a:p>
-            <a:pPr algn="ctr"/>
-            <a:endParaRPr lang="de-DE"/>
-          </a:p>
-        </p:txBody>
-      </p:sp>
-      <p:sp>
-        <p:nvSpPr>
-          <p:cNvPr id="38" name="Textfeld 37"/>
-          <p:cNvSpPr txBox="1"/>
-          <p:nvPr/>
-        </p:nvSpPr>
-        <p:spPr>
-          <a:xfrm>
-            <a:off x="1115616" y="3068960"/>
-            <a:ext cx="1296144" cy="369332"/>
-          </a:xfrm>
-          <a:prstGeom prst="rect">
-            <a:avLst/>
-          </a:prstGeom>
-          <a:noFill/>
-        </p:spPr>
-        <p:txBody>
-          <a:bodyPr wrap="square" rtlCol="0">
-            <a:spAutoFit/>
-          </a:bodyPr>
-          <a:lstStyle/>
-          <a:p>
-            <a:r>
-              <a:rPr lang="de-DE" dirty="0" err="1" smtClean="0"/>
-              <a:t>wheelbase</a:t>
-            </a:r>
-            <a:endParaRPr lang="de-DE" dirty="0"/>
-          </a:p>
-        </p:txBody>
-      </p:sp>
-      <p:sp>
-        <p:nvSpPr>
-          <p:cNvPr id="39" name="Geschweifte Klammer rechts 38"/>
-          <p:cNvSpPr/>
-          <p:nvPr/>
-        </p:nvSpPr>
-        <p:spPr>
-          <a:xfrm rot="10800000">
-            <a:off x="755576" y="2060848"/>
-            <a:ext cx="288032" cy="432048"/>
-          </a:xfrm>
-          <a:prstGeom prst="rightBrace">
-            <a:avLst/>
-          </a:prstGeom>
-        </p:spPr>
-        <p:style>
-          <a:lnRef idx="2">
-            <a:schemeClr val="accent1"/>
-          </a:lnRef>
-          <a:fillRef idx="0">
-            <a:schemeClr val="accent1"/>
-          </a:fillRef>
-          <a:effectRef idx="1">
-            <a:schemeClr val="accent1"/>
-          </a:effectRef>
-          <a:fontRef idx="minor">
-            <a:schemeClr val="tx1"/>
-          </a:fontRef>
-        </p:style>
-        <p:txBody>
-          <a:bodyPr rtlCol="0" anchor="ctr"/>
-          <a:lstStyle/>
-          <a:p>
-            <a:pPr algn="ctr"/>
-            <a:endParaRPr lang="de-DE"/>
-          </a:p>
-        </p:txBody>
-      </p:sp>
-      <p:sp>
-        <p:nvSpPr>
-          <p:cNvPr id="40" name="Textfeld 39"/>
-          <p:cNvSpPr txBox="1"/>
-          <p:nvPr/>
-        </p:nvSpPr>
-        <p:spPr>
-          <a:xfrm>
-            <a:off x="0" y="2060848"/>
-            <a:ext cx="827584" cy="369332"/>
-          </a:xfrm>
-          <a:prstGeom prst="rect">
-            <a:avLst/>
-          </a:prstGeom>
-          <a:noFill/>
-        </p:spPr>
-        <p:txBody>
-          <a:bodyPr wrap="square" rtlCol="0">
-            <a:spAutoFit/>
-          </a:bodyPr>
-          <a:lstStyle/>
-          <a:p>
-            <a:r>
-              <a:rPr lang="de-DE" dirty="0" err="1" smtClean="0"/>
-              <a:t>width</a:t>
-            </a:r>
-            <a:endParaRPr lang="de-DE" dirty="0"/>
-          </a:p>
-        </p:txBody>
-      </p:sp>
-      <p:cxnSp>
-        <p:nvCxnSpPr>
-          <p:cNvPr id="43" name="Gerade Verbindung 42"/>
-          <p:cNvCxnSpPr/>
-          <p:nvPr/>
-        </p:nvCxnSpPr>
-        <p:spPr>
-          <a:xfrm>
-            <a:off x="1296593" y="4883358"/>
-            <a:ext cx="720080" cy="0"/>
-          </a:xfrm>
-          <a:prstGeom prst="line">
-            <a:avLst/>
-          </a:prstGeom>
-        </p:spPr>
-        <p:style>
-          <a:lnRef idx="2">
-            <a:schemeClr val="accent1"/>
-          </a:lnRef>
-          <a:fillRef idx="0">
-            <a:schemeClr val="accent1"/>
-          </a:fillRef>
-          <a:effectRef idx="1">
-            <a:schemeClr val="accent1"/>
-          </a:effectRef>
-          <a:fontRef idx="minor">
-            <a:schemeClr val="tx1"/>
-          </a:fontRef>
-        </p:style>
-      </p:cxnSp>
-      <p:cxnSp>
-        <p:nvCxnSpPr>
-          <p:cNvPr id="44" name="Gerade Verbindung 43"/>
-          <p:cNvCxnSpPr/>
-          <p:nvPr/>
-        </p:nvCxnSpPr>
-        <p:spPr>
-          <a:xfrm>
-            <a:off x="2016673" y="4667334"/>
-            <a:ext cx="0" cy="432048"/>
-          </a:xfrm>
-          <a:prstGeom prst="line">
-            <a:avLst/>
-          </a:prstGeom>
-        </p:spPr>
-        <p:style>
-          <a:lnRef idx="2">
-            <a:schemeClr val="accent1"/>
-          </a:lnRef>
-          <a:fillRef idx="0">
-            <a:schemeClr val="accent1"/>
-          </a:fillRef>
-          <a:effectRef idx="1">
-            <a:schemeClr val="accent1"/>
-          </a:effectRef>
-          <a:fontRef idx="minor">
-            <a:schemeClr val="tx1"/>
-          </a:fontRef>
-        </p:style>
-      </p:cxnSp>
-      <p:cxnSp>
-        <p:nvCxnSpPr>
-          <p:cNvPr id="45" name="Gerade Verbindung 44"/>
-          <p:cNvCxnSpPr/>
-          <p:nvPr/>
-        </p:nvCxnSpPr>
-        <p:spPr>
-          <a:xfrm>
-            <a:off x="1296593" y="4667334"/>
-            <a:ext cx="0" cy="432048"/>
-          </a:xfrm>
-          <a:prstGeom prst="line">
-            <a:avLst/>
-          </a:prstGeom>
-        </p:spPr>
-        <p:style>
-          <a:lnRef idx="2">
-            <a:schemeClr val="accent1"/>
-          </a:lnRef>
-          <a:fillRef idx="0">
-            <a:schemeClr val="accent1"/>
-          </a:fillRef>
-          <a:effectRef idx="1">
-            <a:schemeClr val="accent1"/>
-          </a:effectRef>
-          <a:fontRef idx="minor">
-            <a:schemeClr val="tx1"/>
-          </a:fontRef>
-        </p:style>
-      </p:cxnSp>
-      <p:cxnSp>
-        <p:nvCxnSpPr>
-          <p:cNvPr id="46" name="Gerade Verbindung 45"/>
-          <p:cNvCxnSpPr/>
-          <p:nvPr/>
-        </p:nvCxnSpPr>
-        <p:spPr>
-          <a:xfrm>
-            <a:off x="1152577" y="4667334"/>
-            <a:ext cx="288032" cy="0"/>
-          </a:xfrm>
-          <a:prstGeom prst="line">
-            <a:avLst/>
-          </a:prstGeom>
-        </p:spPr>
-        <p:style>
-          <a:lnRef idx="2">
-            <a:schemeClr val="accent1"/>
-          </a:lnRef>
-          <a:fillRef idx="0">
-            <a:schemeClr val="accent1"/>
-          </a:fillRef>
-          <a:effectRef idx="1">
-            <a:schemeClr val="accent1"/>
-          </a:effectRef>
-          <a:fontRef idx="minor">
-            <a:schemeClr val="tx1"/>
-          </a:fontRef>
-        </p:style>
-      </p:cxnSp>
-      <p:cxnSp>
-        <p:nvCxnSpPr>
-          <p:cNvPr id="47" name="Gerade Verbindung 46"/>
-          <p:cNvCxnSpPr/>
-          <p:nvPr/>
-        </p:nvCxnSpPr>
-        <p:spPr>
-          <a:xfrm>
-            <a:off x="1872657" y="4667334"/>
-            <a:ext cx="288032" cy="0"/>
-          </a:xfrm>
-          <a:prstGeom prst="line">
-            <a:avLst/>
-          </a:prstGeom>
-        </p:spPr>
-        <p:style>
-          <a:lnRef idx="2">
-            <a:schemeClr val="accent1"/>
-          </a:lnRef>
-          <a:fillRef idx="0">
-            <a:schemeClr val="accent1"/>
-          </a:fillRef>
-          <a:effectRef idx="1">
-            <a:schemeClr val="accent1"/>
-          </a:effectRef>
-          <a:fontRef idx="minor">
-            <a:schemeClr val="tx1"/>
-          </a:fontRef>
-        </p:style>
-      </p:cxnSp>
-      <p:cxnSp>
-        <p:nvCxnSpPr>
-          <p:cNvPr id="48" name="Gerade Verbindung 47"/>
-          <p:cNvCxnSpPr/>
-          <p:nvPr/>
-        </p:nvCxnSpPr>
-        <p:spPr>
-          <a:xfrm>
-            <a:off x="1872657" y="5099382"/>
-            <a:ext cx="288032" cy="0"/>
-          </a:xfrm>
-          <a:prstGeom prst="line">
-            <a:avLst/>
-          </a:prstGeom>
-        </p:spPr>
-        <p:style>
-          <a:lnRef idx="2">
-            <a:schemeClr val="accent1"/>
-          </a:lnRef>
-          <a:fillRef idx="0">
-            <a:schemeClr val="accent1"/>
-          </a:fillRef>
-          <a:effectRef idx="1">
-            <a:schemeClr val="accent1"/>
-          </a:effectRef>
-          <a:fontRef idx="minor">
-            <a:schemeClr val="tx1"/>
-          </a:fontRef>
-        </p:style>
-      </p:cxnSp>
-      <p:cxnSp>
-        <p:nvCxnSpPr>
-          <p:cNvPr id="49" name="Gerade Verbindung 48"/>
-          <p:cNvCxnSpPr/>
-          <p:nvPr/>
-        </p:nvCxnSpPr>
-        <p:spPr>
-          <a:xfrm>
-            <a:off x="1152577" y="5099382"/>
-            <a:ext cx="288032" cy="0"/>
-          </a:xfrm>
-          <a:prstGeom prst="line">
-            <a:avLst/>
-          </a:prstGeom>
-        </p:spPr>
-        <p:style>
-          <a:lnRef idx="2">
-            <a:schemeClr val="accent1"/>
-          </a:lnRef>
-          <a:fillRef idx="0">
-            <a:schemeClr val="accent1"/>
-          </a:fillRef>
-          <a:effectRef idx="1">
-            <a:schemeClr val="accent1"/>
-          </a:effectRef>
-          <a:fontRef idx="minor">
-            <a:schemeClr val="tx1"/>
-          </a:fontRef>
-        </p:style>
-      </p:cxnSp>
-      <p:sp>
-        <p:nvSpPr>
           <p:cNvPr id="53" name="Freihandform 52"/>
           <p:cNvSpPr/>
           <p:nvPr/>
@@ -3961,7 +3405,7 @@
         </p:nvSpPr>
         <p:spPr>
           <a:xfrm>
-            <a:off x="2195736" y="4293096"/>
+            <a:off x="2195736" y="4077072"/>
             <a:ext cx="4896544" cy="398243"/>
           </a:xfrm>
           <a:custGeom>
@@ -4063,7 +3507,7 @@
         </p:nvSpPr>
         <p:spPr>
           <a:xfrm>
-            <a:off x="2195736" y="4725144"/>
+            <a:off x="2195736" y="5013176"/>
             <a:ext cx="4896544" cy="398243"/>
           </a:xfrm>
           <a:custGeom>
@@ -4255,8 +3699,8 @@
         </p:nvSpPr>
         <p:spPr>
           <a:xfrm>
-            <a:off x="4499992" y="4725144"/>
-            <a:ext cx="360040" cy="360040"/>
+            <a:off x="3923928" y="4437112"/>
+            <a:ext cx="936104" cy="936104"/>
           </a:xfrm>
           <a:prstGeom prst="donut">
             <a:avLst>
@@ -4301,158 +3745,14 @@
       </p:sp>
       <p:sp>
         <p:nvSpPr>
-          <p:cNvPr id="75" name="Geschweifte Klammer rechts 74"/>
-          <p:cNvSpPr/>
-          <p:nvPr/>
-        </p:nvSpPr>
-        <p:spPr>
-          <a:xfrm rot="16200000">
-            <a:off x="2231740" y="1376772"/>
-            <a:ext cx="288032" cy="648072"/>
-          </a:xfrm>
-          <a:prstGeom prst="rightBrace">
-            <a:avLst/>
-          </a:prstGeom>
-        </p:spPr>
-        <p:style>
-          <a:lnRef idx="2">
-            <a:schemeClr val="accent1"/>
-          </a:lnRef>
-          <a:fillRef idx="0">
-            <a:schemeClr val="accent1"/>
-          </a:fillRef>
-          <a:effectRef idx="1">
-            <a:schemeClr val="accent1"/>
-          </a:effectRef>
-          <a:fontRef idx="minor">
-            <a:schemeClr val="tx1"/>
-          </a:fontRef>
-        </p:style>
-        <p:txBody>
-          <a:bodyPr rtlCol="0" anchor="ctr"/>
-          <a:lstStyle/>
-          <a:p>
-            <a:pPr algn="ctr"/>
-            <a:endParaRPr lang="de-DE"/>
-          </a:p>
-        </p:txBody>
-      </p:sp>
-      <p:sp>
-        <p:nvSpPr>
-          <p:cNvPr id="76" name="Textfeld 75"/>
-          <p:cNvSpPr txBox="1"/>
-          <p:nvPr/>
-        </p:nvSpPr>
-        <p:spPr>
-          <a:xfrm>
-            <a:off x="1187624" y="1196752"/>
-            <a:ext cx="2952328" cy="369332"/>
-          </a:xfrm>
-          <a:prstGeom prst="rect">
-            <a:avLst/>
-          </a:prstGeom>
-          <a:noFill/>
-        </p:spPr>
-        <p:txBody>
-          <a:bodyPr wrap="square" rtlCol="0">
-            <a:spAutoFit/>
-          </a:bodyPr>
-          <a:lstStyle/>
-          <a:p>
-            <a:r>
-              <a:rPr lang="de-DE" dirty="0"/>
-              <a:t>m</a:t>
-            </a:r>
-            <a:r>
-              <a:rPr lang="de-DE" dirty="0" smtClean="0"/>
-              <a:t>in </a:t>
-            </a:r>
-            <a:r>
-              <a:rPr lang="de-DE" dirty="0" err="1" smtClean="0"/>
-              <a:t>target</a:t>
-            </a:r>
-            <a:r>
-              <a:rPr lang="de-DE" dirty="0" smtClean="0"/>
-              <a:t> </a:t>
-            </a:r>
-            <a:r>
-              <a:rPr lang="de-DE" dirty="0" err="1" smtClean="0"/>
-              <a:t>point</a:t>
-            </a:r>
-            <a:r>
-              <a:rPr lang="de-DE" dirty="0" smtClean="0"/>
-              <a:t> </a:t>
-            </a:r>
-            <a:r>
-              <a:rPr lang="de-DE" dirty="0" err="1" smtClean="0"/>
-              <a:t>distance</a:t>
-            </a:r>
-            <a:endParaRPr lang="de-DE" dirty="0"/>
-          </a:p>
-        </p:txBody>
-      </p:sp>
-      <p:sp>
-        <p:nvSpPr>
-          <p:cNvPr id="41" name="Ring 40"/>
-          <p:cNvSpPr/>
-          <p:nvPr/>
-        </p:nvSpPr>
-        <p:spPr>
-          <a:xfrm>
-            <a:off x="4499992" y="4437112"/>
-            <a:ext cx="360040" cy="360040"/>
-          </a:xfrm>
-          <a:prstGeom prst="donut">
-            <a:avLst>
-              <a:gd name="adj" fmla="val 11455"/>
-            </a:avLst>
-          </a:prstGeom>
-          <a:solidFill>
-            <a:srgbClr val="FF0000"/>
-          </a:solidFill>
-          <a:ln>
-            <a:solidFill>
-              <a:schemeClr val="accent5"/>
-            </a:solidFill>
-          </a:ln>
-        </p:spPr>
-        <p:style>
-          <a:lnRef idx="1">
-            <a:schemeClr val="accent1"/>
-          </a:lnRef>
-          <a:fillRef idx="3">
-            <a:schemeClr val="accent1"/>
-          </a:fillRef>
-          <a:effectRef idx="2">
-            <a:schemeClr val="accent1"/>
-          </a:effectRef>
-          <a:fontRef idx="minor">
-            <a:schemeClr val="lt1"/>
-          </a:fontRef>
-        </p:style>
-        <p:txBody>
-          <a:bodyPr rtlCol="0" anchor="ctr"/>
-          <a:lstStyle/>
-          <a:p>
-            <a:pPr algn="ctr"/>
-            <a:endParaRPr lang="de-DE" dirty="0">
-              <a:solidFill>
-                <a:schemeClr val="tx1"/>
-              </a:solidFill>
-            </a:endParaRPr>
-          </a:p>
-        </p:txBody>
-      </p:sp>
-      <p:sp>
-        <p:nvSpPr>
           <p:cNvPr id="42" name="Freihandform 41"/>
           <p:cNvSpPr/>
           <p:nvPr/>
         </p:nvSpPr>
         <p:spPr>
           <a:xfrm>
-            <a:off x="2195736" y="4581128"/>
-            <a:ext cx="2520280" cy="326235"/>
+            <a:off x="2195736" y="4365104"/>
+            <a:ext cx="2232248" cy="542259"/>
           </a:xfrm>
           <a:custGeom>
             <a:avLst/>
@@ -4542,6 +3842,398 @@
           <a:p>
             <a:pPr algn="ctr"/>
             <a:endParaRPr lang="de-DE"/>
+          </a:p>
+        </p:txBody>
+      </p:sp>
+      <p:grpSp>
+        <p:nvGrpSpPr>
+          <p:cNvPr id="5" name="Gruppierung 4"/>
+          <p:cNvGrpSpPr/>
+          <p:nvPr/>
+        </p:nvGrpSpPr>
+        <p:grpSpPr>
+          <a:xfrm rot="5400000">
+            <a:off x="1295636" y="1808820"/>
+            <a:ext cx="720080" cy="936104"/>
+            <a:chOff x="2304900" y="5367780"/>
+            <a:chExt cx="466200" cy="679680"/>
+          </a:xfrm>
+        </p:grpSpPr>
+        <p:sp>
+          <p:nvSpPr>
+            <p:cNvPr id="50" name="CustomShape 9"/>
+            <p:cNvSpPr/>
+            <p:nvPr/>
+          </p:nvSpPr>
+          <p:spPr>
+            <a:xfrm rot="16209000">
+              <a:off x="2198880" y="5572080"/>
+              <a:ext cx="679680" cy="271080"/>
+            </a:xfrm>
+            <a:prstGeom prst="rect">
+              <a:avLst/>
+            </a:prstGeom>
+            <a:ln>
+              <a:round/>
+            </a:ln>
+          </p:spPr>
+          <p:style>
+            <a:lnRef idx="2">
+              <a:schemeClr val="dk1"/>
+            </a:lnRef>
+            <a:fillRef idx="1">
+              <a:schemeClr val="lt1"/>
+            </a:fillRef>
+            <a:effectRef idx="0">
+              <a:schemeClr val="dk1"/>
+            </a:effectRef>
+            <a:fontRef idx="minor"/>
+          </p:style>
+        </p:sp>
+        <p:sp>
+          <p:nvSpPr>
+            <p:cNvPr id="51" name="CustomShape 10"/>
+            <p:cNvSpPr/>
+            <p:nvPr/>
+          </p:nvSpPr>
+          <p:spPr>
+            <a:xfrm rot="16209000">
+              <a:off x="2266920" y="5870520"/>
+              <a:ext cx="170280" cy="94320"/>
+            </a:xfrm>
+            <a:prstGeom prst="rect">
+              <a:avLst/>
+            </a:prstGeom>
+            <a:ln>
+              <a:round/>
+            </a:ln>
+          </p:spPr>
+          <p:style>
+            <a:lnRef idx="2">
+              <a:schemeClr val="dk1"/>
+            </a:lnRef>
+            <a:fillRef idx="1">
+              <a:schemeClr val="lt1"/>
+            </a:fillRef>
+            <a:effectRef idx="0">
+              <a:schemeClr val="dk1"/>
+            </a:effectRef>
+            <a:fontRef idx="minor"/>
+          </p:style>
+        </p:sp>
+        <p:sp>
+          <p:nvSpPr>
+            <p:cNvPr id="52" name="CustomShape 11"/>
+            <p:cNvSpPr/>
+            <p:nvPr/>
+          </p:nvSpPr>
+          <p:spPr>
+            <a:xfrm rot="16209000">
+              <a:off x="2269440" y="5455800"/>
+              <a:ext cx="170280" cy="94680"/>
+            </a:xfrm>
+            <a:prstGeom prst="rect">
+              <a:avLst/>
+            </a:prstGeom>
+            <a:ln>
+              <a:round/>
+            </a:ln>
+          </p:spPr>
+          <p:style>
+            <a:lnRef idx="2">
+              <a:schemeClr val="dk1"/>
+            </a:lnRef>
+            <a:fillRef idx="1">
+              <a:schemeClr val="lt1"/>
+            </a:fillRef>
+            <a:effectRef idx="0">
+              <a:schemeClr val="dk1"/>
+            </a:effectRef>
+            <a:fontRef idx="minor"/>
+          </p:style>
+        </p:sp>
+        <p:sp>
+          <p:nvSpPr>
+            <p:cNvPr id="54" name="CustomShape 12"/>
+            <p:cNvSpPr/>
+            <p:nvPr/>
+          </p:nvSpPr>
+          <p:spPr>
+            <a:xfrm rot="16209000">
+              <a:off x="2637000" y="5452200"/>
+              <a:ext cx="170280" cy="94680"/>
+            </a:xfrm>
+            <a:prstGeom prst="rect">
+              <a:avLst/>
+            </a:prstGeom>
+            <a:ln>
+              <a:round/>
+            </a:ln>
+          </p:spPr>
+          <p:style>
+            <a:lnRef idx="2">
+              <a:schemeClr val="dk1"/>
+            </a:lnRef>
+            <a:fillRef idx="1">
+              <a:schemeClr val="lt1"/>
+            </a:fillRef>
+            <a:effectRef idx="0">
+              <a:schemeClr val="dk1"/>
+            </a:effectRef>
+            <a:fontRef idx="minor"/>
+          </p:style>
+        </p:sp>
+        <p:sp>
+          <p:nvSpPr>
+            <p:cNvPr id="55" name="CustomShape 13"/>
+            <p:cNvSpPr/>
+            <p:nvPr/>
+          </p:nvSpPr>
+          <p:spPr>
+            <a:xfrm rot="16209000">
+              <a:off x="2638800" y="5869080"/>
+              <a:ext cx="170280" cy="94320"/>
+            </a:xfrm>
+            <a:prstGeom prst="rect">
+              <a:avLst/>
+            </a:prstGeom>
+            <a:ln>
+              <a:round/>
+            </a:ln>
+          </p:spPr>
+          <p:style>
+            <a:lnRef idx="2">
+              <a:schemeClr val="dk1"/>
+            </a:lnRef>
+            <a:fillRef idx="1">
+              <a:schemeClr val="lt1"/>
+            </a:fillRef>
+            <a:effectRef idx="0">
+              <a:schemeClr val="dk1"/>
+            </a:effectRef>
+            <a:fontRef idx="minor"/>
+          </p:style>
+        </p:sp>
+      </p:grpSp>
+      <p:grpSp>
+        <p:nvGrpSpPr>
+          <p:cNvPr id="57" name="Gruppierung 56"/>
+          <p:cNvGrpSpPr/>
+          <p:nvPr/>
+        </p:nvGrpSpPr>
+        <p:grpSpPr>
+          <a:xfrm rot="5400000">
+            <a:off x="1223628" y="4473116"/>
+            <a:ext cx="720080" cy="936104"/>
+            <a:chOff x="2304900" y="5367780"/>
+            <a:chExt cx="466200" cy="679680"/>
+          </a:xfrm>
+        </p:grpSpPr>
+        <p:sp>
+          <p:nvSpPr>
+            <p:cNvPr id="59" name="CustomShape 9"/>
+            <p:cNvSpPr/>
+            <p:nvPr/>
+          </p:nvSpPr>
+          <p:spPr>
+            <a:xfrm rot="16209000">
+              <a:off x="2198880" y="5572080"/>
+              <a:ext cx="679680" cy="271080"/>
+            </a:xfrm>
+            <a:prstGeom prst="rect">
+              <a:avLst/>
+            </a:prstGeom>
+            <a:ln>
+              <a:round/>
+            </a:ln>
+          </p:spPr>
+          <p:style>
+            <a:lnRef idx="2">
+              <a:schemeClr val="dk1"/>
+            </a:lnRef>
+            <a:fillRef idx="1">
+              <a:schemeClr val="lt1"/>
+            </a:fillRef>
+            <a:effectRef idx="0">
+              <a:schemeClr val="dk1"/>
+            </a:effectRef>
+            <a:fontRef idx="minor"/>
+          </p:style>
+        </p:sp>
+        <p:sp>
+          <p:nvSpPr>
+            <p:cNvPr id="60" name="CustomShape 10"/>
+            <p:cNvSpPr/>
+            <p:nvPr/>
+          </p:nvSpPr>
+          <p:spPr>
+            <a:xfrm rot="16209000">
+              <a:off x="2266920" y="5870520"/>
+              <a:ext cx="170280" cy="94320"/>
+            </a:xfrm>
+            <a:prstGeom prst="rect">
+              <a:avLst/>
+            </a:prstGeom>
+            <a:ln>
+              <a:round/>
+            </a:ln>
+          </p:spPr>
+          <p:style>
+            <a:lnRef idx="2">
+              <a:schemeClr val="dk1"/>
+            </a:lnRef>
+            <a:fillRef idx="1">
+              <a:schemeClr val="lt1"/>
+            </a:fillRef>
+            <a:effectRef idx="0">
+              <a:schemeClr val="dk1"/>
+            </a:effectRef>
+            <a:fontRef idx="minor"/>
+          </p:style>
+        </p:sp>
+        <p:sp>
+          <p:nvSpPr>
+            <p:cNvPr id="61" name="CustomShape 11"/>
+            <p:cNvSpPr/>
+            <p:nvPr/>
+          </p:nvSpPr>
+          <p:spPr>
+            <a:xfrm rot="16209000">
+              <a:off x="2269440" y="5455800"/>
+              <a:ext cx="170280" cy="94680"/>
+            </a:xfrm>
+            <a:prstGeom prst="rect">
+              <a:avLst/>
+            </a:prstGeom>
+            <a:ln>
+              <a:round/>
+            </a:ln>
+          </p:spPr>
+          <p:style>
+            <a:lnRef idx="2">
+              <a:schemeClr val="dk1"/>
+            </a:lnRef>
+            <a:fillRef idx="1">
+              <a:schemeClr val="lt1"/>
+            </a:fillRef>
+            <a:effectRef idx="0">
+              <a:schemeClr val="dk1"/>
+            </a:effectRef>
+            <a:fontRef idx="minor"/>
+          </p:style>
+        </p:sp>
+        <p:sp>
+          <p:nvSpPr>
+            <p:cNvPr id="63" name="CustomShape 12"/>
+            <p:cNvSpPr/>
+            <p:nvPr/>
+          </p:nvSpPr>
+          <p:spPr>
+            <a:xfrm rot="16209000">
+              <a:off x="2637000" y="5452200"/>
+              <a:ext cx="170280" cy="94680"/>
+            </a:xfrm>
+            <a:prstGeom prst="rect">
+              <a:avLst/>
+            </a:prstGeom>
+            <a:ln>
+              <a:round/>
+            </a:ln>
+          </p:spPr>
+          <p:style>
+            <a:lnRef idx="2">
+              <a:schemeClr val="dk1"/>
+            </a:lnRef>
+            <a:fillRef idx="1">
+              <a:schemeClr val="lt1"/>
+            </a:fillRef>
+            <a:effectRef idx="0">
+              <a:schemeClr val="dk1"/>
+            </a:effectRef>
+            <a:fontRef idx="minor"/>
+          </p:style>
+        </p:sp>
+        <p:sp>
+          <p:nvSpPr>
+            <p:cNvPr id="65" name="CustomShape 13"/>
+            <p:cNvSpPr/>
+            <p:nvPr/>
+          </p:nvSpPr>
+          <p:spPr>
+            <a:xfrm rot="16209000">
+              <a:off x="2638800" y="5869080"/>
+              <a:ext cx="170280" cy="94320"/>
+            </a:xfrm>
+            <a:prstGeom prst="rect">
+              <a:avLst/>
+            </a:prstGeom>
+            <a:ln>
+              <a:round/>
+            </a:ln>
+          </p:spPr>
+          <p:style>
+            <a:lnRef idx="2">
+              <a:schemeClr val="dk1"/>
+            </a:lnRef>
+            <a:fillRef idx="1">
+              <a:schemeClr val="lt1"/>
+            </a:fillRef>
+            <a:effectRef idx="0">
+              <a:schemeClr val="dk1"/>
+            </a:effectRef>
+            <a:fontRef idx="minor"/>
+          </p:style>
+        </p:sp>
+      </p:grpSp>
+      <p:sp>
+        <p:nvSpPr>
+          <p:cNvPr id="66" name="Ring 65"/>
+          <p:cNvSpPr/>
+          <p:nvPr/>
+        </p:nvSpPr>
+        <p:spPr>
+          <a:xfrm>
+            <a:off x="3923928" y="4005064"/>
+            <a:ext cx="936104" cy="936104"/>
+          </a:xfrm>
+          <a:prstGeom prst="donut">
+            <a:avLst>
+              <a:gd name="adj" fmla="val 11455"/>
+            </a:avLst>
+          </a:prstGeom>
+          <a:solidFill>
+            <a:srgbClr val="FF0000"/>
+          </a:solidFill>
+          <a:ln>
+            <a:solidFill>
+              <a:schemeClr val="accent5"/>
+            </a:solidFill>
+          </a:ln>
+        </p:spPr>
+        <p:style>
+          <a:lnRef idx="1">
+            <a:schemeClr val="accent1"/>
+          </a:lnRef>
+          <a:fillRef idx="3">
+            <a:schemeClr val="accent1"/>
+          </a:fillRef>
+          <a:effectRef idx="2">
+            <a:schemeClr val="accent1"/>
+          </a:effectRef>
+          <a:fontRef idx="minor">
+            <a:schemeClr val="lt1"/>
+          </a:fontRef>
+        </p:style>
+        <p:txBody>
+          <a:bodyPr rtlCol="0" anchor="ctr"/>
+          <a:lstStyle/>
+          <a:p>
+            <a:pPr algn="ctr"/>
+            <a:endParaRPr lang="de-DE" dirty="0">
+              <a:solidFill>
+                <a:schemeClr val="tx1"/>
+              </a:solidFill>
+            </a:endParaRPr>
           </a:p>
         </p:txBody>
       </p:sp>
@@ -4648,7 +4340,7 @@
                                 </p:cTn>
                               </p:par>
                               <p:par>
-                                <p:cTn id="11" presetID="1" presetClass="entr" presetSubtype="0" fill="hold" nodeType="withEffect">
+                                <p:cTn id="11" presetID="1" presetClass="entr" presetSubtype="0" fill="hold" grpId="0" nodeType="withEffect">
                                   <p:stCondLst>
                                     <p:cond delay="0"/>
                                   </p:stCondLst>
@@ -4661,7 +4353,7 @@
                                           </p:stCondLst>
                                         </p:cTn>
                                         <p:tgtEl>
-                                          <p:spTgt spid="43"/>
+                                          <p:spTgt spid="53"/>
                                         </p:tgtEl>
                                         <p:attrNameLst>
                                           <p:attrName>style.visibility</p:attrName>
@@ -4675,7 +4367,7 @@
                                 </p:cTn>
                               </p:par>
                               <p:par>
-                                <p:cTn id="13" presetID="1" presetClass="entr" presetSubtype="0" fill="hold" nodeType="withEffect">
+                                <p:cTn id="13" presetID="1" presetClass="entr" presetSubtype="0" fill="hold" grpId="0" nodeType="withEffect">
                                   <p:stCondLst>
                                     <p:cond delay="0"/>
                                   </p:stCondLst>
@@ -4688,7 +4380,7 @@
                                           </p:stCondLst>
                                         </p:cTn>
                                         <p:tgtEl>
-                                          <p:spTgt spid="44"/>
+                                          <p:spTgt spid="56"/>
                                         </p:tgtEl>
                                         <p:attrNameLst>
                                           <p:attrName>style.visibility</p:attrName>
@@ -4702,7 +4394,7 @@
                                 </p:cTn>
                               </p:par>
                               <p:par>
-                                <p:cTn id="15" presetID="1" presetClass="entr" presetSubtype="0" fill="hold" nodeType="withEffect">
+                                <p:cTn id="15" presetID="1" presetClass="entr" presetSubtype="0" fill="hold" grpId="0" nodeType="withEffect">
                                   <p:stCondLst>
                                     <p:cond delay="0"/>
                                   </p:stCondLst>
@@ -4715,7 +4407,7 @@
                                           </p:stCondLst>
                                         </p:cTn>
                                         <p:tgtEl>
-                                          <p:spTgt spid="45"/>
+                                          <p:spTgt spid="58"/>
                                         </p:tgtEl>
                                         <p:attrNameLst>
                                           <p:attrName>style.visibility</p:attrName>
@@ -4742,7 +4434,7 @@
                                           </p:stCondLst>
                                         </p:cTn>
                                         <p:tgtEl>
-                                          <p:spTgt spid="46"/>
+                                          <p:spTgt spid="62"/>
                                         </p:tgtEl>
                                         <p:attrNameLst>
                                           <p:attrName>style.visibility</p:attrName>
@@ -4769,7 +4461,7 @@
                                           </p:stCondLst>
                                         </p:cTn>
                                         <p:tgtEl>
-                                          <p:spTgt spid="47"/>
+                                          <p:spTgt spid="64"/>
                                         </p:tgtEl>
                                         <p:attrNameLst>
                                           <p:attrName>style.visibility</p:attrName>
@@ -4796,7 +4488,7 @@
                                           </p:stCondLst>
                                         </p:cTn>
                                         <p:tgtEl>
-                                          <p:spTgt spid="48"/>
+                                          <p:spTgt spid="72"/>
                                         </p:tgtEl>
                                         <p:attrNameLst>
                                           <p:attrName>style.visibility</p:attrName>
@@ -4809,21 +4501,39 @@
                                   </p:childTnLst>
                                 </p:cTn>
                               </p:par>
+                            </p:childTnLst>
+                          </p:cTn>
+                        </p:par>
+                      </p:childTnLst>
+                    </p:cTn>
+                  </p:par>
+                  <p:par>
+                    <p:cTn id="23" fill="hold">
+                      <p:stCondLst>
+                        <p:cond delay="indefinite"/>
+                      </p:stCondLst>
+                      <p:childTnLst>
+                        <p:par>
+                          <p:cTn id="24" fill="hold">
+                            <p:stCondLst>
+                              <p:cond delay="0"/>
+                            </p:stCondLst>
+                            <p:childTnLst>
                               <p:par>
-                                <p:cTn id="23" presetID="1" presetClass="entr" presetSubtype="0" fill="hold" nodeType="withEffect">
+                                <p:cTn id="25" presetID="1" presetClass="entr" presetSubtype="0" fill="hold" grpId="1" nodeType="clickEffect">
                                   <p:stCondLst>
                                     <p:cond delay="0"/>
                                   </p:stCondLst>
                                   <p:childTnLst>
                                     <p:set>
                                       <p:cBhvr>
-                                        <p:cTn id="24" dur="1" fill="hold">
+                                        <p:cTn id="26" dur="1" fill="hold">
                                           <p:stCondLst>
                                             <p:cond delay="0"/>
                                           </p:stCondLst>
                                         </p:cTn>
                                         <p:tgtEl>
-                                          <p:spTgt spid="49"/>
+                                          <p:spTgt spid="74"/>
                                         </p:tgtEl>
                                         <p:attrNameLst>
                                           <p:attrName>style.visibility</p:attrName>
@@ -4836,15 +4546,60 @@
                                   </p:childTnLst>
                                 </p:cTn>
                               </p:par>
+                            </p:childTnLst>
+                          </p:cTn>
+                        </p:par>
+                      </p:childTnLst>
+                    </p:cTn>
+                  </p:par>
+                  <p:par>
+                    <p:cTn id="27" fill="hold">
+                      <p:stCondLst>
+                        <p:cond delay="indefinite"/>
+                      </p:stCondLst>
+                      <p:childTnLst>
+                        <p:par>
+                          <p:cTn id="28" fill="hold">
+                            <p:stCondLst>
+                              <p:cond delay="0"/>
+                            </p:stCondLst>
+                            <p:childTnLst>
                               <p:par>
-                                <p:cTn id="25" presetID="1" presetClass="entr" presetSubtype="0" fill="hold" grpId="0" nodeType="withEffect">
+                                <p:cTn id="29" presetID="1" presetClass="exit" presetSubtype="0" fill="hold" grpId="1" nodeType="clickEffect">
                                   <p:stCondLst>
                                     <p:cond delay="0"/>
                                   </p:stCondLst>
                                   <p:childTnLst>
                                     <p:set>
                                       <p:cBhvr>
-                                        <p:cTn id="26" dur="1" fill="hold">
+                                        <p:cTn id="30" dur="1" fill="hold">
+                                          <p:stCondLst>
+                                            <p:cond delay="0"/>
+                                          </p:stCondLst>
+                                        </p:cTn>
+                                        <p:tgtEl>
+                                          <p:spTgt spid="56"/>
+                                        </p:tgtEl>
+                                        <p:attrNameLst>
+                                          <p:attrName>style.visibility</p:attrName>
+                                        </p:attrNameLst>
+                                      </p:cBhvr>
+                                      <p:to>
+                                        <p:strVal val="hidden"/>
+                                      </p:to>
+                                    </p:set>
+                                  </p:childTnLst>
+                                </p:cTn>
+                              </p:par>
+                              <p:par>
+                                <p:cTn id="31" presetID="1" presetClass="exit" presetSubtype="0" fill="hold" grpId="1" nodeType="withEffect">
+                                  <p:stCondLst>
+                                    <p:cond delay="0"/>
+                                  </p:stCondLst>
+                                  <p:childTnLst>
+                                    <p:set>
+                                      <p:cBhvr>
+                                        <p:cTn id="32" dur="1" fill="hold">
                                           <p:stCondLst>
                                             <p:cond delay="0"/>
                                           </p:stCondLst>
@@ -4857,48 +4612,21 @@
                                         </p:attrNameLst>
                                       </p:cBhvr>
                                       <p:to>
-                                        <p:strVal val="visible"/>
+                                        <p:strVal val="hidden"/>
                                       </p:to>
                                     </p:set>
                                   </p:childTnLst>
                                 </p:cTn>
                               </p:par>
                               <p:par>
-                                <p:cTn id="27" presetID="1" presetClass="entr" presetSubtype="0" fill="hold" grpId="0" nodeType="withEffect">
+                                <p:cTn id="33" presetID="1" presetClass="exit" presetSubtype="0" fill="hold" grpId="1" nodeType="withEffect">
                                   <p:stCondLst>
                                     <p:cond delay="0"/>
                                   </p:stCondLst>
                                   <p:childTnLst>
                                     <p:set>
                                       <p:cBhvr>
-                                        <p:cTn id="28" dur="1" fill="hold">
-                                          <p:stCondLst>
-                                            <p:cond delay="0"/>
-                                          </p:stCondLst>
-                                        </p:cTn>
-                                        <p:tgtEl>
-                                          <p:spTgt spid="56"/>
-                                        </p:tgtEl>
-                                        <p:attrNameLst>
-                                          <p:attrName>style.visibility</p:attrName>
-                                        </p:attrNameLst>
-                                      </p:cBhvr>
-                                      <p:to>
-                                        <p:strVal val="visible"/>
-                                      </p:to>
-                                    </p:set>
-                                  </p:childTnLst>
-                                </p:cTn>
-                              </p:par>
-                              <p:par>
-                                <p:cTn id="29" presetID="1" presetClass="entr" presetSubtype="0" fill="hold" grpId="0" nodeType="withEffect">
-                                  <p:stCondLst>
-                                    <p:cond delay="0"/>
-                                  </p:stCondLst>
-                                  <p:childTnLst>
-                                    <p:set>
-                                      <p:cBhvr>
-                                        <p:cTn id="30" dur="1" fill="hold">
+                                        <p:cTn id="34" dur="1" fill="hold">
                                           <p:stCondLst>
                                             <p:cond delay="0"/>
                                           </p:stCondLst>
@@ -4911,68 +4639,14 @@
                                         </p:attrNameLst>
                                       </p:cBhvr>
                                       <p:to>
-                                        <p:strVal val="visible"/>
+                                        <p:strVal val="hidden"/>
                                       </p:to>
                                     </p:set>
                                   </p:childTnLst>
                                 </p:cTn>
                               </p:par>
                               <p:par>
-                                <p:cTn id="31" presetID="1" presetClass="entr" presetSubtype="0" fill="hold" nodeType="withEffect">
-                                  <p:stCondLst>
-                                    <p:cond delay="0"/>
-                                  </p:stCondLst>
-                                  <p:childTnLst>
-                                    <p:set>
-                                      <p:cBhvr>
-                                        <p:cTn id="32" dur="1" fill="hold">
-                                          <p:stCondLst>
-                                            <p:cond delay="0"/>
-                                          </p:stCondLst>
-                                        </p:cTn>
-                                        <p:tgtEl>
-                                          <p:spTgt spid="62"/>
-                                        </p:tgtEl>
-                                        <p:attrNameLst>
-                                          <p:attrName>style.visibility</p:attrName>
-                                        </p:attrNameLst>
-                                      </p:cBhvr>
-                                      <p:to>
-                                        <p:strVal val="visible"/>
-                                      </p:to>
-                                    </p:set>
-                                  </p:childTnLst>
-                                </p:cTn>
-                              </p:par>
-                              <p:par>
-                                <p:cTn id="33" presetID="1" presetClass="entr" presetSubtype="0" fill="hold" nodeType="withEffect">
-                                  <p:stCondLst>
-                                    <p:cond delay="0"/>
-                                  </p:stCondLst>
-                                  <p:childTnLst>
-                                    <p:set>
-                                      <p:cBhvr>
-                                        <p:cTn id="34" dur="1" fill="hold">
-                                          <p:stCondLst>
-                                            <p:cond delay="0"/>
-                                          </p:stCondLst>
-                                        </p:cTn>
-                                        <p:tgtEl>
-                                          <p:spTgt spid="64"/>
-                                        </p:tgtEl>
-                                        <p:attrNameLst>
-                                          <p:attrName>style.visibility</p:attrName>
-                                        </p:attrNameLst>
-                                      </p:cBhvr>
-                                      <p:to>
-                                        <p:strVal val="visible"/>
-                                      </p:to>
-                                    </p:set>
-                                  </p:childTnLst>
-                                </p:cTn>
-                              </p:par>
-                              <p:par>
-                                <p:cTn id="35" presetID="1" presetClass="entr" presetSubtype="0" fill="hold" nodeType="withEffect">
+                                <p:cTn id="35" presetID="1" presetClass="entr" presetSubtype="0" fill="hold" grpId="0" nodeType="withEffect">
                                   <p:stCondLst>
                                     <p:cond delay="0"/>
                                   </p:stCondLst>
@@ -4985,7 +4659,7 @@
                                           </p:stCondLst>
                                         </p:cTn>
                                         <p:tgtEl>
-                                          <p:spTgt spid="72"/>
+                                          <p:spTgt spid="42"/>
                                         </p:tgtEl>
                                         <p:attrNameLst>
                                           <p:attrName>style.visibility</p:attrName>
@@ -5017,7 +4691,7 @@
                             </p:stCondLst>
                             <p:childTnLst>
                               <p:par>
-                                <p:cTn id="39" presetID="1" presetClass="entr" presetSubtype="0" fill="hold" grpId="1" nodeType="clickEffect">
+                                <p:cTn id="39" presetID="1" presetClass="entr" presetSubtype="0" fill="hold" grpId="0" nodeType="clickEffect">
                                   <p:stCondLst>
                                     <p:cond delay="0"/>
                                   </p:stCondLst>
@@ -5030,178 +4704,7 @@
                                           </p:stCondLst>
                                         </p:cTn>
                                         <p:tgtEl>
-                                          <p:spTgt spid="74"/>
-                                        </p:tgtEl>
-                                        <p:attrNameLst>
-                                          <p:attrName>style.visibility</p:attrName>
-                                        </p:attrNameLst>
-                                      </p:cBhvr>
-                                      <p:to>
-                                        <p:strVal val="visible"/>
-                                      </p:to>
-                                    </p:set>
-                                  </p:childTnLst>
-                                </p:cTn>
-                              </p:par>
-                            </p:childTnLst>
-                          </p:cTn>
-                        </p:par>
-                      </p:childTnLst>
-                    </p:cTn>
-                  </p:par>
-                  <p:par>
-                    <p:cTn id="41" fill="hold">
-                      <p:stCondLst>
-                        <p:cond delay="indefinite"/>
-                      </p:stCondLst>
-                      <p:childTnLst>
-                        <p:par>
-                          <p:cTn id="42" fill="hold">
-                            <p:stCondLst>
-                              <p:cond delay="0"/>
-                            </p:stCondLst>
-                            <p:childTnLst>
-                              <p:par>
-                                <p:cTn id="43" presetID="1" presetClass="exit" presetSubtype="0" fill="hold" grpId="1" nodeType="clickEffect">
-                                  <p:stCondLst>
-                                    <p:cond delay="0"/>
-                                  </p:stCondLst>
-                                  <p:childTnLst>
-                                    <p:set>
-                                      <p:cBhvr>
-                                        <p:cTn id="44" dur="1" fill="hold">
-                                          <p:stCondLst>
-                                            <p:cond delay="0"/>
-                                          </p:stCondLst>
-                                        </p:cTn>
-                                        <p:tgtEl>
-                                          <p:spTgt spid="56"/>
-                                        </p:tgtEl>
-                                        <p:attrNameLst>
-                                          <p:attrName>style.visibility</p:attrName>
-                                        </p:attrNameLst>
-                                      </p:cBhvr>
-                                      <p:to>
-                                        <p:strVal val="hidden"/>
-                                      </p:to>
-                                    </p:set>
-                                  </p:childTnLst>
-                                </p:cTn>
-                              </p:par>
-                              <p:par>
-                                <p:cTn id="45" presetID="1" presetClass="exit" presetSubtype="0" fill="hold" grpId="1" nodeType="withEffect">
-                                  <p:stCondLst>
-                                    <p:cond delay="0"/>
-                                  </p:stCondLst>
-                                  <p:childTnLst>
-                                    <p:set>
-                                      <p:cBhvr>
-                                        <p:cTn id="46" dur="1" fill="hold">
-                                          <p:stCondLst>
-                                            <p:cond delay="0"/>
-                                          </p:stCondLst>
-                                        </p:cTn>
-                                        <p:tgtEl>
-                                          <p:spTgt spid="53"/>
-                                        </p:tgtEl>
-                                        <p:attrNameLst>
-                                          <p:attrName>style.visibility</p:attrName>
-                                        </p:attrNameLst>
-                                      </p:cBhvr>
-                                      <p:to>
-                                        <p:strVal val="hidden"/>
-                                      </p:to>
-                                    </p:set>
-                                  </p:childTnLst>
-                                </p:cTn>
-                              </p:par>
-                              <p:par>
-                                <p:cTn id="47" presetID="1" presetClass="exit" presetSubtype="0" fill="hold" grpId="1" nodeType="withEffect">
-                                  <p:stCondLst>
-                                    <p:cond delay="0"/>
-                                  </p:stCondLst>
-                                  <p:childTnLst>
-                                    <p:set>
-                                      <p:cBhvr>
-                                        <p:cTn id="48" dur="1" fill="hold">
-                                          <p:stCondLst>
-                                            <p:cond delay="0"/>
-                                          </p:stCondLst>
-                                        </p:cTn>
-                                        <p:tgtEl>
-                                          <p:spTgt spid="58"/>
-                                        </p:tgtEl>
-                                        <p:attrNameLst>
-                                          <p:attrName>style.visibility</p:attrName>
-                                        </p:attrNameLst>
-                                      </p:cBhvr>
-                                      <p:to>
-                                        <p:strVal val="hidden"/>
-                                      </p:to>
-                                    </p:set>
-                                  </p:childTnLst>
-                                </p:cTn>
-                              </p:par>
-                            </p:childTnLst>
-                          </p:cTn>
-                        </p:par>
-                      </p:childTnLst>
-                    </p:cTn>
-                  </p:par>
-                  <p:par>
-                    <p:cTn id="49" fill="hold">
-                      <p:stCondLst>
-                        <p:cond delay="indefinite"/>
-                      </p:stCondLst>
-                      <p:childTnLst>
-                        <p:par>
-                          <p:cTn id="50" fill="hold">
-                            <p:stCondLst>
-                              <p:cond delay="0"/>
-                            </p:stCondLst>
-                            <p:childTnLst>
-                              <p:par>
-                                <p:cTn id="51" presetID="1" presetClass="entr" presetSubtype="0" fill="hold" grpId="0" nodeType="clickEffect">
-                                  <p:stCondLst>
-                                    <p:cond delay="0"/>
-                                  </p:stCondLst>
-                                  <p:childTnLst>
-                                    <p:set>
-                                      <p:cBhvr>
-                                        <p:cTn id="52" dur="1" fill="hold">
-                                          <p:stCondLst>
-                                            <p:cond delay="0"/>
-                                          </p:stCondLst>
-                                        </p:cTn>
-                                        <p:tgtEl>
-                                          <p:spTgt spid="41"/>
-                                        </p:tgtEl>
-                                        <p:attrNameLst>
-                                          <p:attrName>style.visibility</p:attrName>
-                                        </p:attrNameLst>
-                                      </p:cBhvr>
-                                      <p:to>
-                                        <p:strVal val="visible"/>
-                                      </p:to>
-                                    </p:set>
-                                  </p:childTnLst>
-                                </p:cTn>
-                              </p:par>
-                              <p:par>
-                                <p:cTn id="53" presetID="1" presetClass="entr" presetSubtype="0" fill="hold" grpId="0" nodeType="withEffect">
-                                  <p:stCondLst>
-                                    <p:cond delay="0"/>
-                                  </p:stCondLst>
-                                  <p:childTnLst>
-                                    <p:set>
-                                      <p:cBhvr>
-                                        <p:cTn id="54" dur="1" fill="hold">
-                                          <p:stCondLst>
-                                            <p:cond delay="0"/>
-                                          </p:stCondLst>
-                                        </p:cTn>
-                                        <p:tgtEl>
-                                          <p:spTgt spid="42"/>
+                                          <p:spTgt spid="66"/>
                                         </p:tgtEl>
                                         <p:attrNameLst>
                                           <p:attrName>style.visibility</p:attrName>
@@ -5251,8 +4754,8 @@
       <p:bldP spid="58" grpId="0" animBg="1"/>
       <p:bldP spid="58" grpId="1" animBg="1"/>
       <p:bldP spid="74" grpId="1" animBg="1"/>
-      <p:bldP spid="41" grpId="0" animBg="1"/>
       <p:bldP spid="42" grpId="0" animBg="1"/>
+      <p:bldP spid="66" grpId="0" animBg="1"/>
     </p:bldLst>
   </p:timing>
 </p:sld>
@@ -5275,6 +4778,176 @@
           <a:chExt cx="0" cy="0"/>
         </a:xfrm>
       </p:grpSpPr>
+      <p:grpSp>
+        <p:nvGrpSpPr>
+          <p:cNvPr id="28" name="Gruppierung 27"/>
+          <p:cNvGrpSpPr/>
+          <p:nvPr/>
+        </p:nvGrpSpPr>
+        <p:grpSpPr>
+          <a:xfrm>
+            <a:off x="3779912" y="4581128"/>
+            <a:ext cx="720080" cy="1152128"/>
+            <a:chOff x="2304900" y="5367780"/>
+            <a:chExt cx="466200" cy="679680"/>
+          </a:xfrm>
+        </p:grpSpPr>
+        <p:sp>
+          <p:nvSpPr>
+            <p:cNvPr id="31" name="CustomShape 9"/>
+            <p:cNvSpPr/>
+            <p:nvPr/>
+          </p:nvSpPr>
+          <p:spPr>
+            <a:xfrm rot="16209000">
+              <a:off x="2198880" y="5572080"/>
+              <a:ext cx="679680" cy="271080"/>
+            </a:xfrm>
+            <a:prstGeom prst="rect">
+              <a:avLst/>
+            </a:prstGeom>
+            <a:ln>
+              <a:round/>
+            </a:ln>
+          </p:spPr>
+          <p:style>
+            <a:lnRef idx="2">
+              <a:schemeClr val="dk1"/>
+            </a:lnRef>
+            <a:fillRef idx="1">
+              <a:schemeClr val="lt1"/>
+            </a:fillRef>
+            <a:effectRef idx="0">
+              <a:schemeClr val="dk1"/>
+            </a:effectRef>
+            <a:fontRef idx="minor"/>
+          </p:style>
+        </p:sp>
+        <p:sp>
+          <p:nvSpPr>
+            <p:cNvPr id="33" name="CustomShape 10"/>
+            <p:cNvSpPr/>
+            <p:nvPr/>
+          </p:nvSpPr>
+          <p:spPr>
+            <a:xfrm rot="16209000">
+              <a:off x="2266920" y="5870520"/>
+              <a:ext cx="170280" cy="94320"/>
+            </a:xfrm>
+            <a:prstGeom prst="rect">
+              <a:avLst/>
+            </a:prstGeom>
+            <a:ln>
+              <a:round/>
+            </a:ln>
+          </p:spPr>
+          <p:style>
+            <a:lnRef idx="2">
+              <a:schemeClr val="dk1"/>
+            </a:lnRef>
+            <a:fillRef idx="1">
+              <a:schemeClr val="lt1"/>
+            </a:fillRef>
+            <a:effectRef idx="0">
+              <a:schemeClr val="dk1"/>
+            </a:effectRef>
+            <a:fontRef idx="minor"/>
+          </p:style>
+        </p:sp>
+        <p:sp>
+          <p:nvSpPr>
+            <p:cNvPr id="34" name="CustomShape 11"/>
+            <p:cNvSpPr/>
+            <p:nvPr/>
+          </p:nvSpPr>
+          <p:spPr>
+            <a:xfrm rot="16209000">
+              <a:off x="2269440" y="5455800"/>
+              <a:ext cx="170280" cy="94680"/>
+            </a:xfrm>
+            <a:prstGeom prst="rect">
+              <a:avLst/>
+            </a:prstGeom>
+            <a:ln>
+              <a:round/>
+            </a:ln>
+          </p:spPr>
+          <p:style>
+            <a:lnRef idx="2">
+              <a:schemeClr val="dk1"/>
+            </a:lnRef>
+            <a:fillRef idx="1">
+              <a:schemeClr val="lt1"/>
+            </a:fillRef>
+            <a:effectRef idx="0">
+              <a:schemeClr val="dk1"/>
+            </a:effectRef>
+            <a:fontRef idx="minor"/>
+          </p:style>
+        </p:sp>
+        <p:sp>
+          <p:nvSpPr>
+            <p:cNvPr id="36" name="CustomShape 12"/>
+            <p:cNvSpPr/>
+            <p:nvPr/>
+          </p:nvSpPr>
+          <p:spPr>
+            <a:xfrm rot="16209000">
+              <a:off x="2637000" y="5452200"/>
+              <a:ext cx="170280" cy="94680"/>
+            </a:xfrm>
+            <a:prstGeom prst="rect">
+              <a:avLst/>
+            </a:prstGeom>
+            <a:ln>
+              <a:round/>
+            </a:ln>
+          </p:spPr>
+          <p:style>
+            <a:lnRef idx="2">
+              <a:schemeClr val="dk1"/>
+            </a:lnRef>
+            <a:fillRef idx="1">
+              <a:schemeClr val="lt1"/>
+            </a:fillRef>
+            <a:effectRef idx="0">
+              <a:schemeClr val="dk1"/>
+            </a:effectRef>
+            <a:fontRef idx="minor"/>
+          </p:style>
+        </p:sp>
+        <p:sp>
+          <p:nvSpPr>
+            <p:cNvPr id="38" name="CustomShape 13"/>
+            <p:cNvSpPr/>
+            <p:nvPr/>
+          </p:nvSpPr>
+          <p:spPr>
+            <a:xfrm rot="16209000">
+              <a:off x="2638800" y="5869080"/>
+              <a:ext cx="170280" cy="94320"/>
+            </a:xfrm>
+            <a:prstGeom prst="rect">
+              <a:avLst/>
+            </a:prstGeom>
+            <a:ln>
+              <a:round/>
+            </a:ln>
+          </p:spPr>
+          <p:style>
+            <a:lnRef idx="2">
+              <a:schemeClr val="dk1"/>
+            </a:lnRef>
+            <a:fillRef idx="1">
+              <a:schemeClr val="lt1"/>
+            </a:fillRef>
+            <a:effectRef idx="0">
+              <a:schemeClr val="dk1"/>
+            </a:effectRef>
+            <a:fontRef idx="minor"/>
+          </p:style>
+        </p:sp>
+      </p:grpSp>
       <p:sp>
         <p:nvSpPr>
           <p:cNvPr id="48" name="Rechtwinkliges Dreieck 47"/>
@@ -5600,231 +5273,6 @@
           </a:fontRef>
         </p:style>
       </p:cxnSp>
-      <p:grpSp>
-        <p:nvGrpSpPr>
-          <p:cNvPr id="27" name="Gruppierung 26"/>
-          <p:cNvGrpSpPr/>
-          <p:nvPr/>
-        </p:nvGrpSpPr>
-        <p:grpSpPr>
-          <a:xfrm rot="16200000">
-            <a:off x="3635896" y="4941168"/>
-            <a:ext cx="1008112" cy="432048"/>
-            <a:chOff x="1187624" y="2060848"/>
-            <a:chExt cx="1008112" cy="432048"/>
-          </a:xfrm>
-        </p:grpSpPr>
-        <p:cxnSp>
-          <p:nvCxnSpPr>
-            <p:cNvPr id="20" name="Gerade Verbindung 19"/>
-            <p:cNvCxnSpPr/>
-            <p:nvPr/>
-          </p:nvCxnSpPr>
-          <p:spPr>
-            <a:xfrm rot="10800000">
-              <a:off x="1331640" y="2276872"/>
-              <a:ext cx="720080" cy="0"/>
-            </a:xfrm>
-            <a:prstGeom prst="line">
-              <a:avLst/>
-            </a:prstGeom>
-          </p:spPr>
-          <p:style>
-            <a:lnRef idx="2">
-              <a:schemeClr val="accent1"/>
-            </a:lnRef>
-            <a:fillRef idx="0">
-              <a:schemeClr val="accent1"/>
-            </a:fillRef>
-            <a:effectRef idx="1">
-              <a:schemeClr val="accent1"/>
-            </a:effectRef>
-            <a:fontRef idx="minor">
-              <a:schemeClr val="tx1"/>
-            </a:fontRef>
-          </p:style>
-        </p:cxnSp>
-        <p:cxnSp>
-          <p:nvCxnSpPr>
-            <p:cNvPr id="21" name="Gerade Verbindung 20"/>
-            <p:cNvCxnSpPr/>
-            <p:nvPr/>
-          </p:nvCxnSpPr>
-          <p:spPr>
-            <a:xfrm rot="10800000">
-              <a:off x="2051720" y="2060848"/>
-              <a:ext cx="0" cy="432048"/>
-            </a:xfrm>
-            <a:prstGeom prst="line">
-              <a:avLst/>
-            </a:prstGeom>
-          </p:spPr>
-          <p:style>
-            <a:lnRef idx="2">
-              <a:schemeClr val="accent1"/>
-            </a:lnRef>
-            <a:fillRef idx="0">
-              <a:schemeClr val="accent1"/>
-            </a:fillRef>
-            <a:effectRef idx="1">
-              <a:schemeClr val="accent1"/>
-            </a:effectRef>
-            <a:fontRef idx="minor">
-              <a:schemeClr val="tx1"/>
-            </a:fontRef>
-          </p:style>
-        </p:cxnSp>
-        <p:cxnSp>
-          <p:nvCxnSpPr>
-            <p:cNvPr id="22" name="Gerade Verbindung 21"/>
-            <p:cNvCxnSpPr/>
-            <p:nvPr/>
-          </p:nvCxnSpPr>
-          <p:spPr>
-            <a:xfrm rot="10800000">
-              <a:off x="1331640" y="2060848"/>
-              <a:ext cx="0" cy="432048"/>
-            </a:xfrm>
-            <a:prstGeom prst="line">
-              <a:avLst/>
-            </a:prstGeom>
-          </p:spPr>
-          <p:style>
-            <a:lnRef idx="2">
-              <a:schemeClr val="accent1"/>
-            </a:lnRef>
-            <a:fillRef idx="0">
-              <a:schemeClr val="accent1"/>
-            </a:fillRef>
-            <a:effectRef idx="1">
-              <a:schemeClr val="accent1"/>
-            </a:effectRef>
-            <a:fontRef idx="minor">
-              <a:schemeClr val="tx1"/>
-            </a:fontRef>
-          </p:style>
-        </p:cxnSp>
-        <p:cxnSp>
-          <p:nvCxnSpPr>
-            <p:cNvPr id="23" name="Gerade Verbindung 22"/>
-            <p:cNvCxnSpPr/>
-            <p:nvPr/>
-          </p:nvCxnSpPr>
-          <p:spPr>
-            <a:xfrm rot="10800000">
-              <a:off x="1187624" y="2060848"/>
-              <a:ext cx="288032" cy="0"/>
-            </a:xfrm>
-            <a:prstGeom prst="line">
-              <a:avLst/>
-            </a:prstGeom>
-          </p:spPr>
-          <p:style>
-            <a:lnRef idx="2">
-              <a:schemeClr val="accent1"/>
-            </a:lnRef>
-            <a:fillRef idx="0">
-              <a:schemeClr val="accent1"/>
-            </a:fillRef>
-            <a:effectRef idx="1">
-              <a:schemeClr val="accent1"/>
-            </a:effectRef>
-            <a:fontRef idx="minor">
-              <a:schemeClr val="tx1"/>
-            </a:fontRef>
-          </p:style>
-        </p:cxnSp>
-        <p:cxnSp>
-          <p:nvCxnSpPr>
-            <p:cNvPr id="24" name="Gerade Verbindung 23"/>
-            <p:cNvCxnSpPr/>
-            <p:nvPr/>
-          </p:nvCxnSpPr>
-          <p:spPr>
-            <a:xfrm rot="10800000">
-              <a:off x="1907704" y="2060848"/>
-              <a:ext cx="288032" cy="0"/>
-            </a:xfrm>
-            <a:prstGeom prst="line">
-              <a:avLst/>
-            </a:prstGeom>
-          </p:spPr>
-          <p:style>
-            <a:lnRef idx="2">
-              <a:schemeClr val="accent1"/>
-            </a:lnRef>
-            <a:fillRef idx="0">
-              <a:schemeClr val="accent1"/>
-            </a:fillRef>
-            <a:effectRef idx="1">
-              <a:schemeClr val="accent1"/>
-            </a:effectRef>
-            <a:fontRef idx="minor">
-              <a:schemeClr val="tx1"/>
-            </a:fontRef>
-          </p:style>
-        </p:cxnSp>
-        <p:cxnSp>
-          <p:nvCxnSpPr>
-            <p:cNvPr id="25" name="Gerade Verbindung 24"/>
-            <p:cNvCxnSpPr/>
-            <p:nvPr/>
-          </p:nvCxnSpPr>
-          <p:spPr>
-            <a:xfrm rot="10800000">
-              <a:off x="1907704" y="2492896"/>
-              <a:ext cx="288032" cy="0"/>
-            </a:xfrm>
-            <a:prstGeom prst="line">
-              <a:avLst/>
-            </a:prstGeom>
-          </p:spPr>
-          <p:style>
-            <a:lnRef idx="2">
-              <a:schemeClr val="accent1"/>
-            </a:lnRef>
-            <a:fillRef idx="0">
-              <a:schemeClr val="accent1"/>
-            </a:fillRef>
-            <a:effectRef idx="1">
-              <a:schemeClr val="accent1"/>
-            </a:effectRef>
-            <a:fontRef idx="minor">
-              <a:schemeClr val="tx1"/>
-            </a:fontRef>
-          </p:style>
-        </p:cxnSp>
-        <p:cxnSp>
-          <p:nvCxnSpPr>
-            <p:cNvPr id="26" name="Gerade Verbindung 25"/>
-            <p:cNvCxnSpPr/>
-            <p:nvPr/>
-          </p:nvCxnSpPr>
-          <p:spPr>
-            <a:xfrm rot="10800000">
-              <a:off x="1187624" y="2492896"/>
-              <a:ext cx="288032" cy="0"/>
-            </a:xfrm>
-            <a:prstGeom prst="line">
-              <a:avLst/>
-            </a:prstGeom>
-          </p:spPr>
-          <p:style>
-            <a:lnRef idx="2">
-              <a:schemeClr val="accent1"/>
-            </a:lnRef>
-            <a:fillRef idx="0">
-              <a:schemeClr val="accent1"/>
-            </a:fillRef>
-            <a:effectRef idx="1">
-              <a:schemeClr val="accent1"/>
-            </a:effectRef>
-            <a:fontRef idx="minor">
-              <a:schemeClr val="tx1"/>
-            </a:fontRef>
-          </p:style>
-        </p:cxnSp>
-      </p:grpSp>
       <p:sp>
         <p:nvSpPr>
           <p:cNvPr id="32" name="Oval 31"/>
@@ -5974,7 +5422,7 @@
         </p:nvSpPr>
         <p:spPr>
           <a:xfrm>
-            <a:off x="4716016" y="1916832"/>
+            <a:off x="4427984" y="1772816"/>
             <a:ext cx="2808312" cy="369332"/>
           </a:xfrm>
           <a:prstGeom prst="rect">
@@ -5990,12 +5438,300 @@
           <a:p>
             <a:r>
               <a:rPr lang="de-DE" dirty="0" smtClean="0"/>
-              <a:t>TARGET POINT</a:t>
+              <a:t>TARGET </a:t>
+            </a:r>
+            <a:r>
+              <a:rPr lang="de-DE" dirty="0" smtClean="0"/>
+              <a:t>POINT (</a:t>
+            </a:r>
+            <a:r>
+              <a:rPr lang="de-DE" dirty="0" err="1" smtClean="0"/>
+              <a:t>x,y</a:t>
+            </a:r>
+            <a:r>
+              <a:rPr lang="de-DE" dirty="0" smtClean="0"/>
+              <a:t>)</a:t>
             </a:r>
             <a:endParaRPr lang="de-DE" dirty="0"/>
           </a:p>
         </p:txBody>
       </p:sp>
+      <p:cxnSp>
+        <p:nvCxnSpPr>
+          <p:cNvPr id="7" name="Gerade Verbindung mit Pfeil 6"/>
+          <p:cNvCxnSpPr/>
+          <p:nvPr/>
+        </p:nvCxnSpPr>
+        <p:spPr>
+          <a:xfrm>
+            <a:off x="2843808" y="4797152"/>
+            <a:ext cx="0" cy="720080"/>
+          </a:xfrm>
+          <a:prstGeom prst="straightConnector1">
+            <a:avLst/>
+          </a:prstGeom>
+          <a:ln>
+            <a:solidFill>
+              <a:schemeClr val="accent1"/>
+            </a:solidFill>
+            <a:headEnd type="arrow"/>
+            <a:tailEnd type="arrow"/>
+          </a:ln>
+        </p:spPr>
+        <p:style>
+          <a:lnRef idx="2">
+            <a:schemeClr val="accent1"/>
+          </a:lnRef>
+          <a:fillRef idx="0">
+            <a:schemeClr val="accent1"/>
+          </a:fillRef>
+          <a:effectRef idx="1">
+            <a:schemeClr val="accent1"/>
+          </a:effectRef>
+          <a:fontRef idx="minor">
+            <a:schemeClr val="tx1"/>
+          </a:fontRef>
+        </p:style>
+      </p:cxnSp>
+      <p:sp>
+        <p:nvSpPr>
+          <p:cNvPr id="8" name="Textfeld 7"/>
+          <p:cNvSpPr txBox="1"/>
+          <p:nvPr/>
+        </p:nvSpPr>
+        <p:spPr>
+          <a:xfrm>
+            <a:off x="1619672" y="5013176"/>
+            <a:ext cx="1440160" cy="369332"/>
+          </a:xfrm>
+          <a:prstGeom prst="rect">
+            <a:avLst/>
+          </a:prstGeom>
+          <a:noFill/>
+        </p:spPr>
+        <p:txBody>
+          <a:bodyPr wrap="square" rtlCol="0">
+            <a:spAutoFit/>
+          </a:bodyPr>
+          <a:lstStyle/>
+          <a:p>
+            <a:r>
+              <a:rPr lang="de-DE" dirty="0" err="1" smtClean="0"/>
+              <a:t>wheelbase</a:t>
+            </a:r>
+            <a:endParaRPr lang="de-DE" dirty="0"/>
+          </a:p>
+        </p:txBody>
+      </p:sp>
+      <p:sp>
+        <p:nvSpPr>
+          <p:cNvPr id="11" name="Eckige Klammer links/rechts 10"/>
+          <p:cNvSpPr/>
+          <p:nvPr/>
+        </p:nvSpPr>
+        <p:spPr>
+          <a:xfrm>
+            <a:off x="6516216" y="2348880"/>
+            <a:ext cx="2232248" cy="1296144"/>
+          </a:xfrm>
+          <a:prstGeom prst="bracketPair">
+            <a:avLst/>
+          </a:prstGeom>
+        </p:spPr>
+        <p:style>
+          <a:lnRef idx="2">
+            <a:schemeClr val="accent1"/>
+          </a:lnRef>
+          <a:fillRef idx="0">
+            <a:schemeClr val="accent1"/>
+          </a:fillRef>
+          <a:effectRef idx="1">
+            <a:schemeClr val="accent1"/>
+          </a:effectRef>
+          <a:fontRef idx="minor">
+            <a:schemeClr val="tx1"/>
+          </a:fontRef>
+        </p:style>
+        <p:txBody>
+          <a:bodyPr rtlCol="0" anchor="ctr"/>
+          <a:lstStyle/>
+          <a:p>
+            <a:pPr algn="ctr"/>
+            <a:endParaRPr lang="de-DE"/>
+          </a:p>
+        </p:txBody>
+      </p:sp>
+      <p:graphicFrame>
+        <p:nvGraphicFramePr>
+          <p:cNvPr id="15" name="Objekt 14"/>
+          <p:cNvGraphicFramePr>
+            <a:graphicFrameLocks noChangeAspect="1"/>
+          </p:cNvGraphicFramePr>
+          <p:nvPr>
+            <p:extLst>
+              <p:ext uri="{D42A27DB-BD31-4B8C-83A1-F6EECF244321}">
+                <p14:modId xmlns:p14="http://schemas.microsoft.com/office/powerpoint/2010/main" val="1838511398"/>
+              </p:ext>
+            </p:extLst>
+          </p:nvPr>
+        </p:nvGraphicFramePr>
+        <p:xfrm>
+          <a:off x="7020272" y="2564904"/>
+          <a:ext cx="1152128" cy="268830"/>
+        </p:xfrm>
+        <a:graphic>
+          <a:graphicData uri="http://schemas.openxmlformats.org/presentationml/2006/ole">
+            <mc:AlternateContent xmlns:mc="http://schemas.openxmlformats.org/markup-compatibility/2006">
+              <mc:Choice xmlns:v="urn:schemas-microsoft-com:vml" Requires="v">
+                <p:oleObj spid="_x0000_s1036" name="Formel" r:id="rId3" imgW="762000" imgH="177800" progId="Equation.3">
+                  <p:embed/>
+                </p:oleObj>
+              </mc:Choice>
+              <mc:Fallback>
+                <p:oleObj name="Formel" r:id="rId3" imgW="762000" imgH="177800" progId="Equation.3">
+                  <p:embed/>
+                  <p:pic>
+                    <p:nvPicPr>
+                      <p:cNvPr id="0" name=""/>
+                      <p:cNvPicPr/>
+                      <p:nvPr/>
+                    </p:nvPicPr>
+                    <p:blipFill>
+                      <a:blip r:embed="rId4"/>
+                      <a:stretch>
+                        <a:fillRect/>
+                      </a:stretch>
+                    </p:blipFill>
+                    <p:spPr>
+                      <a:xfrm>
+                        <a:off x="7020272" y="2564904"/>
+                        <a:ext cx="1152128" cy="268830"/>
+                      </a:xfrm>
+                      <a:prstGeom prst="rect">
+                        <a:avLst/>
+                      </a:prstGeom>
+                    </p:spPr>
+                  </p:pic>
+                </p:oleObj>
+              </mc:Fallback>
+            </mc:AlternateContent>
+          </a:graphicData>
+        </a:graphic>
+      </p:graphicFrame>
+      <p:graphicFrame>
+        <p:nvGraphicFramePr>
+          <p:cNvPr id="17" name="Objekt 16"/>
+          <p:cNvGraphicFramePr>
+            <a:graphicFrameLocks noChangeAspect="1"/>
+          </p:cNvGraphicFramePr>
+          <p:nvPr>
+            <p:extLst>
+              <p:ext uri="{D42A27DB-BD31-4B8C-83A1-F6EECF244321}">
+                <p14:modId xmlns:p14="http://schemas.microsoft.com/office/powerpoint/2010/main" val="3184029542"/>
+              </p:ext>
+            </p:extLst>
+          </p:nvPr>
+        </p:nvGraphicFramePr>
+        <p:xfrm>
+          <a:off x="6516216" y="2924944"/>
+          <a:ext cx="2203445" cy="648072"/>
+        </p:xfrm>
+        <a:graphic>
+          <a:graphicData uri="http://schemas.openxmlformats.org/presentationml/2006/ole">
+            <mc:AlternateContent xmlns:mc="http://schemas.openxmlformats.org/markup-compatibility/2006">
+              <mc:Choice xmlns:v="urn:schemas-microsoft-com:vml" Requires="v">
+                <p:oleObj spid="_x0000_s1037" name="Formel" r:id="rId5" imgW="1511300" imgH="444500" progId="Equation.3">
+                  <p:embed/>
+                </p:oleObj>
+              </mc:Choice>
+              <mc:Fallback>
+                <p:oleObj name="Formel" r:id="rId5" imgW="1511300" imgH="444500" progId="Equation.3">
+                  <p:embed/>
+                  <p:pic>
+                    <p:nvPicPr>
+                      <p:cNvPr id="0" name=""/>
+                      <p:cNvPicPr/>
+                      <p:nvPr/>
+                    </p:nvPicPr>
+                    <p:blipFill>
+                      <a:blip r:embed="rId6"/>
+                      <a:stretch>
+                        <a:fillRect/>
+                      </a:stretch>
+                    </p:blipFill>
+                    <p:spPr>
+                      <a:xfrm>
+                        <a:off x="6516216" y="2924944"/>
+                        <a:ext cx="2203445" cy="648072"/>
+                      </a:xfrm>
+                      <a:prstGeom prst="rect">
+                        <a:avLst/>
+                      </a:prstGeom>
+                    </p:spPr>
+                  </p:pic>
+                </p:oleObj>
+              </mc:Fallback>
+            </mc:AlternateContent>
+          </a:graphicData>
+        </a:graphic>
+      </p:graphicFrame>
+      <p:graphicFrame>
+        <p:nvGraphicFramePr>
+          <p:cNvPr id="18" name="Objekt 17"/>
+          <p:cNvGraphicFramePr>
+            <a:graphicFrameLocks noChangeAspect="1"/>
+          </p:cNvGraphicFramePr>
+          <p:nvPr>
+            <p:extLst>
+              <p:ext uri="{D42A27DB-BD31-4B8C-83A1-F6EECF244321}">
+                <p14:modId xmlns:p14="http://schemas.microsoft.com/office/powerpoint/2010/main" val="3989219870"/>
+              </p:ext>
+            </p:extLst>
+          </p:nvPr>
+        </p:nvGraphicFramePr>
+        <p:xfrm>
+          <a:off x="1115616" y="2924944"/>
+          <a:ext cx="2859118" cy="576064"/>
+        </p:xfrm>
+        <a:graphic>
+          <a:graphicData uri="http://schemas.openxmlformats.org/presentationml/2006/ole">
+            <mc:AlternateContent xmlns:mc="http://schemas.openxmlformats.org/markup-compatibility/2006">
+              <mc:Choice xmlns:v="urn:schemas-microsoft-com:vml" Requires="v">
+                <p:oleObj spid="_x0000_s1038" name="Formel" r:id="rId7" imgW="2311400" imgH="393700" progId="Equation.3">
+                  <p:embed/>
+                </p:oleObj>
+              </mc:Choice>
+              <mc:Fallback>
+                <p:oleObj name="Formel" r:id="rId7" imgW="2311400" imgH="393700" progId="Equation.3">
+                  <p:embed/>
+                  <p:pic>
+                    <p:nvPicPr>
+                      <p:cNvPr id="0" name=""/>
+                      <p:cNvPicPr/>
+                      <p:nvPr/>
+                    </p:nvPicPr>
+                    <p:blipFill>
+                      <a:blip r:embed="rId8"/>
+                      <a:stretch>
+                        <a:fillRect/>
+                      </a:stretch>
+                    </p:blipFill>
+                    <p:spPr>
+                      <a:xfrm>
+                        <a:off x="1115616" y="2924944"/>
+                        <a:ext cx="2859118" cy="576064"/>
+                      </a:xfrm>
+                      <a:prstGeom prst="rect">
+                        <a:avLst/>
+                      </a:prstGeom>
+                    </p:spPr>
+                  </p:pic>
+                </p:oleObj>
+              </mc:Fallback>
+            </mc:AlternateContent>
+          </a:graphicData>
+        </a:graphic>
+      </p:graphicFrame>
     </p:spTree>
     <p:extLst>
       <p:ext uri="{BB962C8B-B14F-4D97-AF65-F5344CB8AC3E}">
@@ -6139,6 +5875,105 @@
                                           </p:stCondLst>
                                         </p:cTn>
                                         <p:tgtEl>
+                                          <p:spTgt spid="11"/>
+                                        </p:tgtEl>
+                                        <p:attrNameLst>
+                                          <p:attrName>style.visibility</p:attrName>
+                                        </p:attrNameLst>
+                                      </p:cBhvr>
+                                      <p:to>
+                                        <p:strVal val="visible"/>
+                                      </p:to>
+                                    </p:set>
+                                  </p:childTnLst>
+                                </p:cTn>
+                              </p:par>
+                              <p:par>
+                                <p:cTn id="15" presetID="1" presetClass="entr" presetSubtype="0" fill="hold" nodeType="withEffect">
+                                  <p:stCondLst>
+                                    <p:cond delay="0"/>
+                                  </p:stCondLst>
+                                  <p:childTnLst>
+                                    <p:set>
+                                      <p:cBhvr>
+                                        <p:cTn id="16" dur="1" fill="hold">
+                                          <p:stCondLst>
+                                            <p:cond delay="0"/>
+                                          </p:stCondLst>
+                                        </p:cTn>
+                                        <p:tgtEl>
+                                          <p:spTgt spid="15"/>
+                                        </p:tgtEl>
+                                        <p:attrNameLst>
+                                          <p:attrName>style.visibility</p:attrName>
+                                        </p:attrNameLst>
+                                      </p:cBhvr>
+                                      <p:to>
+                                        <p:strVal val="visible"/>
+                                      </p:to>
+                                    </p:set>
+                                  </p:childTnLst>
+                                </p:cTn>
+                              </p:par>
+                              <p:par>
+                                <p:cTn id="17" presetID="1" presetClass="entr" presetSubtype="0" fill="hold" nodeType="withEffect">
+                                  <p:stCondLst>
+                                    <p:cond delay="0"/>
+                                  </p:stCondLst>
+                                  <p:childTnLst>
+                                    <p:set>
+                                      <p:cBhvr>
+                                        <p:cTn id="18" dur="1" fill="hold">
+                                          <p:stCondLst>
+                                            <p:cond delay="0"/>
+                                          </p:stCondLst>
+                                        </p:cTn>
+                                        <p:tgtEl>
+                                          <p:spTgt spid="17"/>
+                                        </p:tgtEl>
+                                        <p:attrNameLst>
+                                          <p:attrName>style.visibility</p:attrName>
+                                        </p:attrNameLst>
+                                      </p:cBhvr>
+                                      <p:to>
+                                        <p:strVal val="visible"/>
+                                      </p:to>
+                                    </p:set>
+                                  </p:childTnLst>
+                                </p:cTn>
+                              </p:par>
+                            </p:childTnLst>
+                          </p:cTn>
+                        </p:par>
+                      </p:childTnLst>
+                    </p:cTn>
+                  </p:par>
+                  <p:par>
+                    <p:cTn id="19" fill="hold">
+                      <p:stCondLst>
+                        <p:cond delay="indefinite"/>
+                      </p:stCondLst>
+                      <p:childTnLst>
+                        <p:par>
+                          <p:cTn id="20" fill="hold">
+                            <p:stCondLst>
+                              <p:cond delay="0"/>
+                            </p:stCondLst>
+                            <p:childTnLst>
+                              <p:par>
+                                <p:cTn id="21" presetID="1" presetClass="entr" presetSubtype="0" fill="hold" grpId="0" nodeType="clickEffect">
+                                  <p:stCondLst>
+                                    <p:cond delay="0"/>
+                                  </p:stCondLst>
+                                  <p:childTnLst>
+                                    <p:set>
+                                      <p:cBhvr>
+                                        <p:cTn id="22" dur="1" fill="hold">
+                                          <p:stCondLst>
+                                            <p:cond delay="0"/>
+                                          </p:stCondLst>
+                                        </p:cTn>
+                                        <p:tgtEl>
                                           <p:spTgt spid="35"/>
                                         </p:tgtEl>
                                         <p:attrNameLst>
@@ -6159,26 +5994,26 @@
                     </p:cTn>
                   </p:par>
                   <p:par>
-                    <p:cTn id="15" fill="hold">
+                    <p:cTn id="23" fill="hold">
                       <p:stCondLst>
                         <p:cond delay="indefinite"/>
                       </p:stCondLst>
                       <p:childTnLst>
                         <p:par>
-                          <p:cTn id="16" fill="hold">
+                          <p:cTn id="24" fill="hold">
                             <p:stCondLst>
                               <p:cond delay="0"/>
                             </p:stCondLst>
                             <p:childTnLst>
                               <p:par>
-                                <p:cTn id="17" presetID="1" presetClass="entr" presetSubtype="0" fill="hold" grpId="0" nodeType="clickEffect">
+                                <p:cTn id="25" presetID="1" presetClass="entr" presetSubtype="0" fill="hold" grpId="0" nodeType="clickEffect">
                                   <p:stCondLst>
                                     <p:cond delay="0"/>
                                   </p:stCondLst>
                                   <p:childTnLst>
                                     <p:set>
                                       <p:cBhvr>
-                                        <p:cTn id="18" dur="1" fill="hold">
+                                        <p:cTn id="26" dur="1" fill="hold">
                                           <p:stCondLst>
                                             <p:cond delay="0"/>
                                           </p:stCondLst>
@@ -6198,20 +6033,65 @@
                                 </p:cTn>
                               </p:par>
                               <p:par>
-                                <p:cTn id="19" presetID="1" presetClass="entr" presetSubtype="0" fill="hold" nodeType="withEffect">
+                                <p:cTn id="27" presetID="1" presetClass="entr" presetSubtype="0" fill="hold" nodeType="withEffect">
                                   <p:stCondLst>
                                     <p:cond delay="0"/>
                                   </p:stCondLst>
                                   <p:childTnLst>
                                     <p:set>
                                       <p:cBhvr>
-                                        <p:cTn id="20" dur="1" fill="hold">
+                                        <p:cTn id="28" dur="1" fill="hold">
                                           <p:stCondLst>
                                             <p:cond delay="0"/>
                                           </p:stCondLst>
                                         </p:cTn>
                                         <p:tgtEl>
                                           <p:spTgt spid="45"/>
+                                        </p:tgtEl>
+                                        <p:attrNameLst>
+                                          <p:attrName>style.visibility</p:attrName>
+                                        </p:attrNameLst>
+                                      </p:cBhvr>
+                                      <p:to>
+                                        <p:strVal val="visible"/>
+                                      </p:to>
+                                    </p:set>
+                                  </p:childTnLst>
+                                </p:cTn>
+                              </p:par>
+                            </p:childTnLst>
+                          </p:cTn>
+                        </p:par>
+                      </p:childTnLst>
+                    </p:cTn>
+                  </p:par>
+                  <p:par>
+                    <p:cTn id="29" fill="hold">
+                      <p:stCondLst>
+                        <p:cond delay="indefinite"/>
+                      </p:stCondLst>
+                      <p:childTnLst>
+                        <p:par>
+                          <p:cTn id="30" fill="hold">
+                            <p:stCondLst>
+                              <p:cond delay="0"/>
+                            </p:stCondLst>
+                            <p:childTnLst>
+                              <p:par>
+                                <p:cTn id="31" presetID="1" presetClass="entr" presetSubtype="0" fill="hold" nodeType="clickEffect">
+                                  <p:stCondLst>
+                                    <p:cond delay="0"/>
+                                  </p:stCondLst>
+                                  <p:childTnLst>
+                                    <p:set>
+                                      <p:cBhvr>
+                                        <p:cTn id="32" dur="1" fill="hold">
+                                          <p:stCondLst>
+                                            <p:cond delay="0"/>
+                                          </p:stCondLst>
+                                        </p:cTn>
+                                        <p:tgtEl>
+                                          <p:spTgt spid="18"/>
                                         </p:tgtEl>
                                         <p:attrNameLst>
                                           <p:attrName>style.visibility</p:attrName>
@@ -6255,6 +6135,7 @@
       <p:bldP spid="48" grpId="0" animBg="1"/>
       <p:bldP spid="42" grpId="0" animBg="1"/>
       <p:bldP spid="35" grpId="0" animBg="1"/>
+      <p:bldP spid="11" grpId="0" animBg="1"/>
     </p:bldLst>
   </p:timing>
 </p:sld>

</xml_diff>